<commit_message>
add fonts and background to pptx
</commit_message>
<xml_diff>
--- a/bday.pptx
+++ b/bday.pptx
@@ -261,7 +261,7 @@
           <a:p>
             <a:fld id="{6C3EBCB3-725C-45BA-9CF7-2C94D16AAD7C}" type="datetimeFigureOut">
               <a:rPr lang="en-IL" smtClean="0"/>
-              <a:t>05/09/2022</a:t>
+              <a:t>11/09/2022</a:t>
             </a:fld>
             <a:endParaRPr lang="en-IL"/>
           </a:p>
@@ -461,7 +461,7 @@
           <a:p>
             <a:fld id="{6C3EBCB3-725C-45BA-9CF7-2C94D16AAD7C}" type="datetimeFigureOut">
               <a:rPr lang="en-IL" smtClean="0"/>
-              <a:t>05/09/2022</a:t>
+              <a:t>11/09/2022</a:t>
             </a:fld>
             <a:endParaRPr lang="en-IL"/>
           </a:p>
@@ -671,7 +671,7 @@
           <a:p>
             <a:fld id="{6C3EBCB3-725C-45BA-9CF7-2C94D16AAD7C}" type="datetimeFigureOut">
               <a:rPr lang="en-IL" smtClean="0"/>
-              <a:t>05/09/2022</a:t>
+              <a:t>11/09/2022</a:t>
             </a:fld>
             <a:endParaRPr lang="en-IL"/>
           </a:p>
@@ -871,7 +871,7 @@
           <a:p>
             <a:fld id="{6C3EBCB3-725C-45BA-9CF7-2C94D16AAD7C}" type="datetimeFigureOut">
               <a:rPr lang="en-IL" smtClean="0"/>
-              <a:t>05/09/2022</a:t>
+              <a:t>11/09/2022</a:t>
             </a:fld>
             <a:endParaRPr lang="en-IL"/>
           </a:p>
@@ -1147,7 +1147,7 @@
           <a:p>
             <a:fld id="{6C3EBCB3-725C-45BA-9CF7-2C94D16AAD7C}" type="datetimeFigureOut">
               <a:rPr lang="en-IL" smtClean="0"/>
-              <a:t>05/09/2022</a:t>
+              <a:t>11/09/2022</a:t>
             </a:fld>
             <a:endParaRPr lang="en-IL"/>
           </a:p>
@@ -1415,7 +1415,7 @@
           <a:p>
             <a:fld id="{6C3EBCB3-725C-45BA-9CF7-2C94D16AAD7C}" type="datetimeFigureOut">
               <a:rPr lang="en-IL" smtClean="0"/>
-              <a:t>05/09/2022</a:t>
+              <a:t>11/09/2022</a:t>
             </a:fld>
             <a:endParaRPr lang="en-IL"/>
           </a:p>
@@ -1830,7 +1830,7 @@
           <a:p>
             <a:fld id="{6C3EBCB3-725C-45BA-9CF7-2C94D16AAD7C}" type="datetimeFigureOut">
               <a:rPr lang="en-IL" smtClean="0"/>
-              <a:t>05/09/2022</a:t>
+              <a:t>11/09/2022</a:t>
             </a:fld>
             <a:endParaRPr lang="en-IL"/>
           </a:p>
@@ -1972,7 +1972,7 @@
           <a:p>
             <a:fld id="{6C3EBCB3-725C-45BA-9CF7-2C94D16AAD7C}" type="datetimeFigureOut">
               <a:rPr lang="en-IL" smtClean="0"/>
-              <a:t>05/09/2022</a:t>
+              <a:t>11/09/2022</a:t>
             </a:fld>
             <a:endParaRPr lang="en-IL"/>
           </a:p>
@@ -2085,7 +2085,7 @@
           <a:p>
             <a:fld id="{6C3EBCB3-725C-45BA-9CF7-2C94D16AAD7C}" type="datetimeFigureOut">
               <a:rPr lang="en-IL" smtClean="0"/>
-              <a:t>05/09/2022</a:t>
+              <a:t>11/09/2022</a:t>
             </a:fld>
             <a:endParaRPr lang="en-IL"/>
           </a:p>
@@ -2398,7 +2398,7 @@
           <a:p>
             <a:fld id="{6C3EBCB3-725C-45BA-9CF7-2C94D16AAD7C}" type="datetimeFigureOut">
               <a:rPr lang="en-IL" smtClean="0"/>
-              <a:t>05/09/2022</a:t>
+              <a:t>11/09/2022</a:t>
             </a:fld>
             <a:endParaRPr lang="en-IL"/>
           </a:p>
@@ -2687,7 +2687,7 @@
           <a:p>
             <a:fld id="{6C3EBCB3-725C-45BA-9CF7-2C94D16AAD7C}" type="datetimeFigureOut">
               <a:rPr lang="en-IL" smtClean="0"/>
-              <a:t>05/09/2022</a:t>
+              <a:t>11/09/2022</a:t>
             </a:fld>
             <a:endParaRPr lang="en-IL"/>
           </a:p>
@@ -2930,7 +2930,7 @@
           <a:p>
             <a:fld id="{6C3EBCB3-725C-45BA-9CF7-2C94D16AAD7C}" type="datetimeFigureOut">
               <a:rPr lang="en-IL" smtClean="0"/>
-              <a:t>05/09/2022</a:t>
+              <a:t>11/09/2022</a:t>
             </a:fld>
             <a:endParaRPr lang="en-IL"/>
           </a:p>
@@ -3349,6 +3349,54 @@
       </p:grpSpPr>
       <p:pic>
         <p:nvPicPr>
+          <p:cNvPr id="1030" name="Picture 6" descr="Sky Light Images | Free Vectors, Stock Photos &amp; PSD">
+            <a:extLst>
+              <a:ext uri="{FF2B5EF4-FFF2-40B4-BE49-F238E27FC236}">
+                <a16:creationId xmlns:a16="http://schemas.microsoft.com/office/drawing/2014/main" id="{6A014974-4E73-49C0-BD54-5833B280363A}"/>
+              </a:ext>
+            </a:extLst>
+          </p:cNvPr>
+          <p:cNvPicPr>
+            <a:picLocks noChangeAspect="1" noChangeArrowheads="1"/>
+          </p:cNvPicPr>
+          <p:nvPr/>
+        </p:nvPicPr>
+        <p:blipFill>
+          <a:blip r:embed="rId2">
+            <a:alphaModFix amt="50000"/>
+            <a:extLst>
+              <a:ext uri="{28A0092B-C50C-407E-A947-70E740481C1C}">
+                <a14:useLocalDpi xmlns:a14="http://schemas.microsoft.com/office/drawing/2010/main" val="0"/>
+              </a:ext>
+            </a:extLst>
+          </a:blip>
+          <a:srcRect/>
+          <a:stretch>
+            <a:fillRect/>
+          </a:stretch>
+        </p:blipFill>
+        <p:spPr bwMode="auto">
+          <a:xfrm>
+            <a:off x="-241207" y="-798772"/>
+            <a:ext cx="12671901" cy="8445327"/>
+          </a:xfrm>
+          <a:prstGeom prst="rect">
+            <a:avLst/>
+          </a:prstGeom>
+          <a:noFill/>
+          <a:extLst>
+            <a:ext uri="{909E8E84-426E-40DD-AFC4-6F175D3DCCD1}">
+              <a14:hiddenFill xmlns:a14="http://schemas.microsoft.com/office/drawing/2010/main">
+                <a:solidFill>
+                  <a:srgbClr val="FFFFFF"/>
+                </a:solidFill>
+              </a14:hiddenFill>
+            </a:ext>
+          </a:extLst>
+        </p:spPr>
+      </p:pic>
+      <p:pic>
+        <p:nvPicPr>
           <p:cNvPr id="10" name="Picture 2" descr="Balloons Fly Sticker - Balloons Fly Sky Blue Stickers">
             <a:extLst>
               <a:ext uri="{FF2B5EF4-FFF2-40B4-BE49-F238E27FC236}">
@@ -3362,7 +3410,7 @@
           <p:nvPr/>
         </p:nvPicPr>
         <p:blipFill>
-          <a:blip r:embed="rId2">
+          <a:blip r:embed="rId3">
             <a:extLst>
               <a:ext uri="{28A0092B-C50C-407E-A947-70E740481C1C}">
                 <a14:useLocalDpi xmlns:a14="http://schemas.microsoft.com/office/drawing/2010/main" val="0"/>
@@ -3409,8 +3457,60 @@
           <p:nvPr/>
         </p:nvPicPr>
         <p:blipFill rotWithShape="1">
-          <a:blip r:embed="rId3">
-            <a:extLst>
+          <a:blip r:embed="rId4">
+            <a:alphaModFix amt="70000"/>
+            <a:extLst>
+              <a:ext uri="{BEBA8EAE-BF5A-486C-A8C5-ECC9F3942E4B}">
+                <a14:imgProps xmlns:a14="http://schemas.microsoft.com/office/drawing/2010/main">
+                  <a14:imgLayer r:embed="rId5">
+                    <a14:imgEffect>
+                      <a14:backgroundRemoval t="3242" b="97257" l="9569" r="91588">
+                        <a14:foregroundMark x1="35016" y1="10973" x2="57729" y2="3242"/>
+                        <a14:foregroundMark x1="86015" y1="41022" x2="91483" y2="57232"/>
+                        <a14:foregroundMark x1="91483" y1="57232" x2="91588" y2="60100"/>
+                        <a14:foregroundMark x1="31966" y1="91895" x2="44795" y2="94888"/>
+                        <a14:foregroundMark x1="44795" y1="94888" x2="56677" y2="93142"/>
+                        <a14:foregroundMark x1="48160" y1="96758" x2="54154" y2="97257"/>
+                        <a14:foregroundMark x1="57729" y1="82918" x2="53943" y2="62718"/>
+                        <a14:foregroundMark x1="53943" y1="62718" x2="68244" y2="56858"/>
+                        <a14:foregroundMark x1="68244" y1="56858" x2="75920" y2="56608"/>
+                        <a14:foregroundMark x1="76972" y1="63716" x2="55731" y2="57481"/>
+                        <a14:foregroundMark x1="55731" y1="57481" x2="50789" y2="78429"/>
+                        <a14:foregroundMark x1="50789" y1="78429" x2="56677" y2="84663"/>
+                        <a14:foregroundMark x1="50683" y1="82918" x2="53733" y2="56608"/>
+                        <a14:foregroundMark x1="53733" y1="56608" x2="71399" y2="52369"/>
+                        <a14:foregroundMark x1="65300" y1="48753" x2="50368" y2="52993"/>
+                        <a14:foregroundMark x1="50368" y1="52993" x2="42797" y2="69701"/>
+                        <a14:foregroundMark x1="42797" y1="69701" x2="48160" y2="75187"/>
+                        <a14:foregroundMark x1="54679" y1="52369" x2="71609" y2="49501"/>
+                        <a14:foregroundMark x1="71609" y1="49501" x2="80336" y2="64339"/>
+                        <a14:foregroundMark x1="80336" y1="64339" x2="66562" y2="73067"/>
+                        <a14:foregroundMark x1="66562" y1="73067" x2="62250" y2="72693"/>
+                        <a14:foregroundMark x1="68875" y1="48753" x2="81388" y2="53990"/>
+                        <a14:foregroundMark x1="81388" y1="53990" x2="86540" y2="59601"/>
+                        <a14:foregroundMark x1="79916" y1="55362" x2="84017" y2="66085"/>
+                        <a14:foregroundMark x1="82019" y1="71571" x2="80967" y2="69202"/>
+                        <a14:foregroundMark x1="82965" y1="76933" x2="82965" y2="76933"/>
+                        <a14:foregroundMark x1="75394" y1="73940" x2="75394" y2="73940"/>
+                        <a14:foregroundMark x1="61725" y1="75187" x2="65825" y2="75187"/>
+                        <a14:foregroundMark x1="75920" y1="73317" x2="75920" y2="70948"/>
+                        <a14:foregroundMark x1="71924" y1="70948" x2="76446" y2="73317"/>
+                        <a14:foregroundMark x1="73396" y1="73317" x2="63828" y2="82918"/>
+                        <a14:foregroundMark x1="75394" y1="82294" x2="62776" y2="89401"/>
+                        <a14:foregroundMark x1="62776" y1="89401" x2="61304" y2="84663"/>
+                        <a14:foregroundMark x1="46583" y1="79302" x2="56993" y2="89776"/>
+                        <a14:foregroundMark x1="56993" y1="89776" x2="57729" y2="90150"/>
+                        <a14:foregroundMark x1="57729" y1="89526" x2="63828" y2="90773"/>
+                        <a14:backgroundMark x1="8202" y1="16958" x2="7676" y2="68579"/>
+                        <a14:backgroundMark x1="81493" y1="3741" x2="99159" y2="15461"/>
+                        <a14:backgroundMark x1="99159" y1="15461" x2="99159" y2="16334"/>
+                        <a14:backgroundMark x1="94637" y1="72195" x2="84017" y2="99751"/>
+                        <a14:backgroundMark x1="4627" y1="79302" x2="25868" y2="93142"/>
+                      </a14:backgroundRemoval>
+                    </a14:imgEffect>
+                  </a14:imgLayer>
+                </a14:imgProps>
+              </a:ext>
               <a:ext uri="{28A0092B-C50C-407E-A947-70E740481C1C}">
                 <a14:useLocalDpi xmlns:a14="http://schemas.microsoft.com/office/drawing/2010/main" val="0"/>
               </a:ext>
@@ -3421,8 +3521,8 @@
         </p:blipFill>
         <p:spPr>
           <a:xfrm>
-            <a:off x="-193965" y="3626872"/>
-            <a:ext cx="3657601" cy="3145052"/>
+            <a:off x="-263988" y="3672162"/>
+            <a:ext cx="3490508" cy="3001374"/>
           </a:xfrm>
           <a:prstGeom prst="rect">
             <a:avLst/>
@@ -3444,7 +3544,7 @@
           <p:nvPr/>
         </p:nvPicPr>
         <p:blipFill>
-          <a:blip r:embed="rId2">
+          <a:blip r:embed="rId3">
             <a:duotone>
               <a:prstClr val="black"/>
               <a:srgbClr val="FF0000">
@@ -3498,7 +3598,7 @@
           <p:nvPr/>
         </p:nvPicPr>
         <p:blipFill>
-          <a:blip r:embed="rId2">
+          <a:blip r:embed="rId3">
             <a:duotone>
               <a:prstClr val="black"/>
               <a:schemeClr val="accent6">
@@ -3552,7 +3652,7 @@
           <p:nvPr/>
         </p:nvPicPr>
         <p:blipFill>
-          <a:blip r:embed="rId2">
+          <a:blip r:embed="rId3">
             <a:duotone>
               <a:prstClr val="black"/>
               <a:schemeClr val="accent1">
@@ -3606,7 +3706,7 @@
           <p:nvPr/>
         </p:nvPicPr>
         <p:blipFill>
-          <a:blip r:embed="rId2">
+          <a:blip r:embed="rId3">
             <a:extLst>
               <a:ext uri="{28A0092B-C50C-407E-A947-70E740481C1C}">
                 <a14:useLocalDpi xmlns:a14="http://schemas.microsoft.com/office/drawing/2010/main" val="0"/>
@@ -3653,7 +3753,7 @@
           <p:nvPr/>
         </p:nvPicPr>
         <p:blipFill>
-          <a:blip r:embed="rId2">
+          <a:blip r:embed="rId3">
             <a:duotone>
               <a:prstClr val="black"/>
               <a:srgbClr val="FFC000">
@@ -3707,7 +3807,7 @@
           <p:nvPr/>
         </p:nvPicPr>
         <p:blipFill>
-          <a:blip r:embed="rId2">
+          <a:blip r:embed="rId3">
             <a:duotone>
               <a:prstClr val="black"/>
               <a:schemeClr val="accent2">
@@ -3761,7 +3861,7 @@
           <p:nvPr/>
         </p:nvPicPr>
         <p:blipFill>
-          <a:blip r:embed="rId2">
+          <a:blip r:embed="rId3">
             <a:duotone>
               <a:schemeClr val="accent4">
                 <a:shade val="45000"/>
@@ -3815,7 +3915,7 @@
           <p:nvPr/>
         </p:nvPicPr>
         <p:blipFill>
-          <a:blip r:embed="rId4">
+          <a:blip r:embed="rId6">
             <a:duotone>
               <a:prstClr val="black"/>
               <a:schemeClr val="accent6">
@@ -3826,7 +3926,7 @@
             <a:extLst>
               <a:ext uri="{BEBA8EAE-BF5A-486C-A8C5-ECC9F3942E4B}">
                 <a14:imgProps xmlns:a14="http://schemas.microsoft.com/office/drawing/2010/main">
-                  <a14:imgLayer r:embed="rId5">
+                  <a14:imgLayer r:embed="rId7">
                     <a14:imgEffect>
                       <a14:saturation sat="400000"/>
                     </a14:imgEffect>
@@ -3878,7 +3978,7 @@
           <p:nvPr/>
         </p:nvPicPr>
         <p:blipFill>
-          <a:blip r:embed="rId2">
+          <a:blip r:embed="rId3">
             <a:extLst>
               <a:ext uri="{28A0092B-C50C-407E-A947-70E740481C1C}">
                 <a14:useLocalDpi xmlns:a14="http://schemas.microsoft.com/office/drawing/2010/main" val="0"/>
@@ -3925,7 +4025,7 @@
           <p:nvPr/>
         </p:nvPicPr>
         <p:blipFill>
-          <a:blip r:embed="rId2">
+          <a:blip r:embed="rId3">
             <a:duotone>
               <a:prstClr val="black"/>
               <a:srgbClr val="FF0000">
@@ -3979,7 +4079,7 @@
           <p:nvPr/>
         </p:nvPicPr>
         <p:blipFill>
-          <a:blip r:embed="rId2">
+          <a:blip r:embed="rId3">
             <a:duotone>
               <a:prstClr val="black"/>
               <a:schemeClr val="accent6">
@@ -4033,7 +4133,7 @@
           <p:nvPr/>
         </p:nvPicPr>
         <p:blipFill>
-          <a:blip r:embed="rId2">
+          <a:blip r:embed="rId3">
             <a:duotone>
               <a:prstClr val="black"/>
               <a:schemeClr val="accent1">
@@ -4087,7 +4187,7 @@
           <p:nvPr/>
         </p:nvPicPr>
         <p:blipFill>
-          <a:blip r:embed="rId2">
+          <a:blip r:embed="rId3">
             <a:extLst>
               <a:ext uri="{28A0092B-C50C-407E-A947-70E740481C1C}">
                 <a14:useLocalDpi xmlns:a14="http://schemas.microsoft.com/office/drawing/2010/main" val="0"/>
@@ -4134,7 +4234,7 @@
           <p:nvPr/>
         </p:nvPicPr>
         <p:blipFill>
-          <a:blip r:embed="rId2">
+          <a:blip r:embed="rId3">
             <a:duotone>
               <a:prstClr val="black"/>
               <a:srgbClr val="FFC000">
@@ -4188,7 +4288,7 @@
           <p:nvPr/>
         </p:nvPicPr>
         <p:blipFill>
-          <a:blip r:embed="rId2">
+          <a:blip r:embed="rId3">
             <a:duotone>
               <a:schemeClr val="accent4">
                 <a:shade val="45000"/>
@@ -4242,7 +4342,7 @@
           <p:nvPr/>
         </p:nvPicPr>
         <p:blipFill>
-          <a:blip r:embed="rId4">
+          <a:blip r:embed="rId6">
             <a:duotone>
               <a:prstClr val="black"/>
               <a:schemeClr val="accent6">
@@ -4253,7 +4353,7 @@
             <a:extLst>
               <a:ext uri="{BEBA8EAE-BF5A-486C-A8C5-ECC9F3942E4B}">
                 <a14:imgProps xmlns:a14="http://schemas.microsoft.com/office/drawing/2010/main">
-                  <a14:imgLayer r:embed="rId5">
+                  <a14:imgLayer r:embed="rId7">
                     <a14:imgEffect>
                       <a14:saturation sat="400000"/>
                     </a14:imgEffect>
@@ -4305,7 +4405,7 @@
         <p:spPr>
           <a:xfrm>
             <a:off x="2731362" y="1852830"/>
-            <a:ext cx="6729274" cy="1107996"/>
+            <a:ext cx="6729274" cy="1323439"/>
           </a:xfrm>
           <a:prstGeom prst="rect">
             <a:avLst/>
@@ -4320,31 +4420,43 @@
           <a:p>
             <a:pPr algn="ctr"/>
             <a:r>
-              <a:rPr lang="he-IL" sz="6600" dirty="0">
-                <a:ln w="0"/>
+              <a:rPr lang="he-IL" sz="8000" b="1" dirty="0">
+                <a:ln w="6600">
+                  <a:solidFill>
+                    <a:srgbClr val="FA8E8E"/>
+                  </a:solidFill>
+                  <a:prstDash val="solid"/>
+                </a:ln>
+                <a:solidFill>
+                  <a:srgbClr val="FFFFFF"/>
+                </a:solidFill>
                 <a:effectLst>
-                  <a:outerShdw blurRad="38100" dist="19050" dir="2700000" algn="tl" rotWithShape="0">
-                    <a:schemeClr val="dk1">
-                      <a:alpha val="40000"/>
-                    </a:schemeClr>
+                  <a:outerShdw dist="38100" dir="2700000" algn="tl" rotWithShape="0">
+                    <a:schemeClr val="accent2"/>
                   </a:outerShdw>
                 </a:effectLst>
-                <a:latin typeface="Aharoni" panose="02010803020104030203" pitchFamily="2" charset="-79"/>
-                <a:cs typeface="+mj-cs"/>
+                <a:latin typeface="FrankRuehl" panose="020E0503060101010101" pitchFamily="34" charset="-79"/>
+                <a:cs typeface="FrankRuehl" panose="020E0503060101010101" pitchFamily="34" charset="-79"/>
               </a:rPr>
-              <a:t> בוקר טוב דן</a:t>
-            </a:r>
-            <a:endParaRPr lang="en-IL" sz="6600" dirty="0">
-              <a:ln w="0"/>
+              <a:t> בוקר טוב יהונדב</a:t>
+            </a:r>
+            <a:endParaRPr lang="en-IL" sz="8000" b="1" dirty="0">
+              <a:ln w="6600">
+                <a:solidFill>
+                  <a:srgbClr val="FA8E8E"/>
+                </a:solidFill>
+                <a:prstDash val="solid"/>
+              </a:ln>
+              <a:solidFill>
+                <a:srgbClr val="FFFFFF"/>
+              </a:solidFill>
               <a:effectLst>
-                <a:outerShdw blurRad="38100" dist="19050" dir="2700000" algn="tl" rotWithShape="0">
-                  <a:schemeClr val="dk1">
-                    <a:alpha val="40000"/>
-                  </a:schemeClr>
+                <a:outerShdw dist="38100" dir="2700000" algn="tl" rotWithShape="0">
+                  <a:schemeClr val="accent2"/>
                 </a:outerShdw>
               </a:effectLst>
-              <a:latin typeface="Aharoni" panose="02010803020104030203" pitchFamily="2" charset="-79"/>
-              <a:cs typeface="+mj-cs"/>
+              <a:latin typeface="FrankRuehl" panose="020E0503060101010101" pitchFamily="34" charset="-79"/>
+              <a:cs typeface="FrankRuehl" panose="020E0503060101010101" pitchFamily="34" charset="-79"/>
             </a:endParaRPr>
           </a:p>
         </p:txBody>
@@ -4379,8 +4491,23 @@
           <a:p>
             <a:pPr algn="ctr"/>
             <a:r>
-              <a:rPr lang="he-IL" sz="4000" dirty="0">
-                <a:cs typeface="+mj-cs"/>
+              <a:rPr lang="he-IL" sz="4000" b="1" dirty="0">
+                <a:ln w="6600">
+                  <a:solidFill>
+                    <a:srgbClr val="FA8E8E"/>
+                  </a:solidFill>
+                  <a:prstDash val="solid"/>
+                </a:ln>
+                <a:solidFill>
+                  <a:srgbClr val="FFFFFF"/>
+                </a:solidFill>
+                <a:effectLst>
+                  <a:outerShdw dist="38100" dir="2700000" algn="tl" rotWithShape="0">
+                    <a:schemeClr val="accent2"/>
+                  </a:outerShdw>
+                </a:effectLst>
+                <a:latin typeface="FrankRuehl" panose="020E0503060101010101" pitchFamily="34" charset="-79"/>
+                <a:cs typeface="FrankRuehl" panose="020E0503060101010101" pitchFamily="34" charset="-79"/>
               </a:rPr>
               <a:t>בברכה,</a:t>
             </a:r>
@@ -4388,8 +4515,23 @@
           <a:p>
             <a:pPr algn="ctr"/>
             <a:r>
-              <a:rPr lang="he-IL" sz="4000" dirty="0">
-                <a:cs typeface="+mj-cs"/>
+              <a:rPr lang="he-IL" sz="4000" b="1" dirty="0">
+                <a:ln w="6600">
+                  <a:solidFill>
+                    <a:srgbClr val="FA8E8E"/>
+                  </a:solidFill>
+                  <a:prstDash val="solid"/>
+                </a:ln>
+                <a:solidFill>
+                  <a:srgbClr val="FFFFFF"/>
+                </a:solidFill>
+                <a:effectLst>
+                  <a:outerShdw dist="38100" dir="2700000" algn="tl" rotWithShape="0">
+                    <a:schemeClr val="accent2"/>
+                  </a:outerShdw>
+                </a:effectLst>
+                <a:latin typeface="FrankRuehl" panose="020E0503060101010101" pitchFamily="34" charset="-79"/>
+                <a:cs typeface="FrankRuehl" panose="020E0503060101010101" pitchFamily="34" charset="-79"/>
               </a:rPr>
               <a:t>רן אשכנזי, אל"מ </a:t>
             </a:r>
@@ -4397,13 +4539,43 @@
           <a:p>
             <a:pPr algn="ctr"/>
             <a:r>
-              <a:rPr lang="he-IL" sz="4000" dirty="0">
-                <a:cs typeface="+mj-cs"/>
+              <a:rPr lang="he-IL" sz="4000" b="1" dirty="0">
+                <a:ln w="6600">
+                  <a:solidFill>
+                    <a:srgbClr val="FA8E8E"/>
+                  </a:solidFill>
+                  <a:prstDash val="solid"/>
+                </a:ln>
+                <a:solidFill>
+                  <a:srgbClr val="FFFFFF"/>
+                </a:solidFill>
+                <a:effectLst>
+                  <a:outerShdw dist="38100" dir="2700000" algn="tl" rotWithShape="0">
+                    <a:schemeClr val="accent2"/>
+                  </a:outerShdw>
+                </a:effectLst>
+                <a:latin typeface="FrankRuehl" panose="020E0503060101010101" pitchFamily="34" charset="-79"/>
+                <a:cs typeface="FrankRuehl" panose="020E0503060101010101" pitchFamily="34" charset="-79"/>
               </a:rPr>
               <a:t>מח"ט        214</a:t>
             </a:r>
-            <a:endParaRPr lang="en-IL" sz="4000" dirty="0">
-              <a:cs typeface="+mj-cs"/>
+            <a:endParaRPr lang="en-IL" sz="4000" b="1" dirty="0">
+              <a:ln w="6600">
+                <a:solidFill>
+                  <a:srgbClr val="FA8E8E"/>
+                </a:solidFill>
+                <a:prstDash val="solid"/>
+              </a:ln>
+              <a:solidFill>
+                <a:srgbClr val="FFFFFF"/>
+              </a:solidFill>
+              <a:effectLst>
+                <a:outerShdw dist="38100" dir="2700000" algn="tl" rotWithShape="0">
+                  <a:schemeClr val="accent2"/>
+                </a:outerShdw>
+              </a:effectLst>
+              <a:latin typeface="FrankRuehl" panose="020E0503060101010101" pitchFamily="34" charset="-79"/>
+              <a:cs typeface="FrankRuehl" panose="020E0503060101010101" pitchFamily="34" charset="-79"/>
             </a:endParaRPr>
           </a:p>
         </p:txBody>
@@ -4438,31 +4610,43 @@
           <a:p>
             <a:pPr algn="ctr"/>
             <a:r>
-              <a:rPr lang="he-IL" sz="4000" dirty="0">
-                <a:ln w="0"/>
+              <a:rPr lang="he-IL" sz="4000" b="1" dirty="0">
+                <a:ln w="6600">
+                  <a:solidFill>
+                    <a:srgbClr val="FA8E8E"/>
+                  </a:solidFill>
+                  <a:prstDash val="solid"/>
+                </a:ln>
+                <a:solidFill>
+                  <a:srgbClr val="FFFFFF"/>
+                </a:solidFill>
                 <a:effectLst>
-                  <a:outerShdw blurRad="38100" dist="19050" dir="2700000" algn="tl" rotWithShape="0">
-                    <a:schemeClr val="dk1">
-                      <a:alpha val="40000"/>
-                    </a:schemeClr>
+                  <a:outerShdw dist="38100" dir="2700000" algn="tl" rotWithShape="0">
+                    <a:schemeClr val="accent2"/>
                   </a:outerShdw>
                 </a:effectLst>
-                <a:latin typeface="Aharoni" panose="02010803020104030203" pitchFamily="2" charset="-79"/>
-                <a:cs typeface="+mj-cs"/>
+                <a:latin typeface="FrankRuehl" panose="020E0503060101010101" pitchFamily="34" charset="-79"/>
+                <a:cs typeface="FrankRuehl" panose="020E0503060101010101" pitchFamily="34" charset="-79"/>
               </a:rPr>
-              <a:t>בשמי ובשם מפקדי וחיילי חטיבת האש 214, ברצוני לאחל לך מזל טוב לרגל יום הולדתך ה23!</a:t>
-            </a:r>
-            <a:endParaRPr lang="en-IL" sz="4000" dirty="0">
-              <a:ln w="0"/>
+              <a:t>בשמי ובשם מפקדי וחיילי חטיבת האש 214, ברצוני לאחל לך מזל טוב לרגל יום הולדתך ה128!</a:t>
+            </a:r>
+            <a:endParaRPr lang="en-IL" sz="4000" b="1" dirty="0">
+              <a:ln w="6600">
+                <a:solidFill>
+                  <a:srgbClr val="FA8E8E"/>
+                </a:solidFill>
+                <a:prstDash val="solid"/>
+              </a:ln>
+              <a:solidFill>
+                <a:srgbClr val="FFFFFF"/>
+              </a:solidFill>
               <a:effectLst>
-                <a:outerShdw blurRad="38100" dist="19050" dir="2700000" algn="tl" rotWithShape="0">
-                  <a:schemeClr val="dk1">
-                    <a:alpha val="40000"/>
-                  </a:schemeClr>
+                <a:outerShdw dist="38100" dir="2700000" algn="tl" rotWithShape="0">
+                  <a:schemeClr val="accent2"/>
                 </a:outerShdw>
               </a:effectLst>
-              <a:latin typeface="Aharoni" panose="02010803020104030203" pitchFamily="2" charset="-79"/>
-              <a:cs typeface="+mj-cs"/>
+              <a:latin typeface="FrankRuehl" panose="020E0503060101010101" pitchFamily="34" charset="-79"/>
+              <a:cs typeface="FrankRuehl" panose="020E0503060101010101" pitchFamily="34" charset="-79"/>
             </a:endParaRPr>
           </a:p>
         </p:txBody>
@@ -4481,7 +4665,7 @@
         </p:nvSpPr>
         <p:spPr>
           <a:xfrm>
-            <a:off x="3070858" y="3158521"/>
+            <a:off x="2901111" y="3158521"/>
             <a:ext cx="6389778" cy="830997"/>
           </a:xfrm>
           <a:prstGeom prst="rect">
@@ -4497,22 +4681,43 @@
           <a:p>
             <a:pPr algn="ctr"/>
             <a:r>
-              <a:rPr lang="he-IL" sz="4800" dirty="0">
-                <a:ln w="0"/>
+              <a:rPr lang="he-IL" sz="4800" b="1" dirty="0">
+                <a:ln w="6600">
+                  <a:solidFill>
+                    <a:srgbClr val="FA8E8E"/>
+                  </a:solidFill>
+                  <a:prstDash val="solid"/>
+                </a:ln>
+                <a:solidFill>
+                  <a:srgbClr val="FFFFFF"/>
+                </a:solidFill>
                 <a:effectLst>
-                  <a:outerShdw blurRad="38100" dist="19050" dir="2700000" algn="tl" rotWithShape="0">
-                    <a:schemeClr val="dk1">
-                      <a:alpha val="40000"/>
-                    </a:schemeClr>
+                  <a:outerShdw dist="38100" dir="2700000" algn="tl" rotWithShape="0">
+                    <a:schemeClr val="accent2"/>
                   </a:outerShdw>
                 </a:effectLst>
-                <a:latin typeface="Aharoni" panose="02010803020104030203" pitchFamily="2" charset="-79"/>
-                <a:cs typeface="+mj-cs"/>
+                <a:latin typeface="FrankRuehl" panose="020E0503060101010101" pitchFamily="34" charset="-79"/>
+                <a:cs typeface="FrankRuehl" panose="020E0503060101010101" pitchFamily="34" charset="-79"/>
               </a:rPr>
               <a:t>אושר, בריאות והצלחה בכל.</a:t>
             </a:r>
-            <a:endParaRPr lang="en-IL" sz="4800" dirty="0">
-              <a:cs typeface="+mj-cs"/>
+            <a:endParaRPr lang="en-IL" sz="4800" b="1" dirty="0">
+              <a:ln w="6600">
+                <a:solidFill>
+                  <a:srgbClr val="FA8E8E"/>
+                </a:solidFill>
+                <a:prstDash val="solid"/>
+              </a:ln>
+              <a:solidFill>
+                <a:srgbClr val="FFFFFF"/>
+              </a:solidFill>
+              <a:effectLst>
+                <a:outerShdw dist="38100" dir="2700000" algn="tl" rotWithShape="0">
+                  <a:schemeClr val="accent2"/>
+                </a:outerShdw>
+              </a:effectLst>
+              <a:latin typeface="FrankRuehl" panose="020E0503060101010101" pitchFamily="34" charset="-79"/>
+              <a:cs typeface="FrankRuehl" panose="020E0503060101010101" pitchFamily="34" charset="-79"/>
             </a:endParaRPr>
           </a:p>
         </p:txBody>
@@ -4532,7 +4737,7 @@
           <p:nvPr/>
         </p:nvPicPr>
         <p:blipFill>
-          <a:blip r:embed="rId2">
+          <a:blip r:embed="rId3">
             <a:extLst>
               <a:ext uri="{28A0092B-C50C-407E-A947-70E740481C1C}">
                 <a14:useLocalDpi xmlns:a14="http://schemas.microsoft.com/office/drawing/2010/main" val="0"/>
@@ -4579,7 +4784,7 @@
           <p:nvPr/>
         </p:nvPicPr>
         <p:blipFill>
-          <a:blip r:embed="rId2">
+          <a:blip r:embed="rId3">
             <a:duotone>
               <a:prstClr val="black"/>
               <a:srgbClr val="FF0000">
@@ -4633,7 +4838,7 @@
           <p:nvPr/>
         </p:nvPicPr>
         <p:blipFill>
-          <a:blip r:embed="rId2">
+          <a:blip r:embed="rId3">
             <a:duotone>
               <a:prstClr val="black"/>
               <a:schemeClr val="accent6">
@@ -4687,7 +4892,7 @@
           <p:nvPr/>
         </p:nvPicPr>
         <p:blipFill>
-          <a:blip r:embed="rId2">
+          <a:blip r:embed="rId3">
             <a:duotone>
               <a:prstClr val="black"/>
               <a:schemeClr val="accent1">
@@ -4741,7 +4946,7 @@
           <p:nvPr/>
         </p:nvPicPr>
         <p:blipFill>
-          <a:blip r:embed="rId2">
+          <a:blip r:embed="rId3">
             <a:extLst>
               <a:ext uri="{28A0092B-C50C-407E-A947-70E740481C1C}">
                 <a14:useLocalDpi xmlns:a14="http://schemas.microsoft.com/office/drawing/2010/main" val="0"/>
@@ -4788,7 +4993,7 @@
           <p:nvPr/>
         </p:nvPicPr>
         <p:blipFill>
-          <a:blip r:embed="rId2">
+          <a:blip r:embed="rId3">
             <a:duotone>
               <a:prstClr val="black"/>
               <a:srgbClr val="FFC000">
@@ -4842,7 +5047,7 @@
           <p:nvPr/>
         </p:nvPicPr>
         <p:blipFill>
-          <a:blip r:embed="rId2">
+          <a:blip r:embed="rId3">
             <a:duotone>
               <a:schemeClr val="accent4">
                 <a:shade val="45000"/>
@@ -4896,7 +5101,7 @@
           <p:nvPr/>
         </p:nvPicPr>
         <p:blipFill>
-          <a:blip r:embed="rId4">
+          <a:blip r:embed="rId6">
             <a:duotone>
               <a:prstClr val="black"/>
               <a:schemeClr val="accent6">
@@ -4907,7 +5112,7 @@
             <a:extLst>
               <a:ext uri="{BEBA8EAE-BF5A-486C-A8C5-ECC9F3942E4B}">
                 <a14:imgProps xmlns:a14="http://schemas.microsoft.com/office/drawing/2010/main">
-                  <a14:imgLayer r:embed="rId5">
+                  <a14:imgLayer r:embed="rId7">
                     <a14:imgEffect>
                       <a14:saturation sat="400000"/>
                     </a14:imgEffect>
@@ -5491,7 +5696,7 @@
                                   <p:childTnLst>
                                     <p:animMotion origin="layout" path="M -0.00221 -0.07616 L -0.05078 -2.88148 " pathEditMode="relative" rAng="0" ptsTypes="AA">
                                       <p:cBhvr>
-                                        <p:cTn id="52" dur="17000" fill="hold"/>
+                                        <p:cTn id="52" dur="17300" fill="hold"/>
                                         <p:tgtEl>
                                           <p:spTgt spid="28"/>
                                         </p:tgtEl>
@@ -5513,7 +5718,7 @@
                                   <p:childTnLst>
                                     <p:animMotion origin="layout" path="M 3.33333E-6 3.7037E-6 L -0.0392 -2.43912 " pathEditMode="relative" rAng="0" ptsTypes="AA">
                                       <p:cBhvr>
-                                        <p:cTn id="54" dur="17000" fill="hold"/>
+                                        <p:cTn id="54" dur="17300" fill="hold"/>
                                         <p:tgtEl>
                                           <p:spTgt spid="25"/>
                                         </p:tgtEl>
@@ -5528,10 +5733,13 @@
                                 </p:cTn>
                               </p:par>
                               <p:par>
-                                <p:cTn id="55" presetID="42" presetClass="entr" presetSubtype="0" fill="hold" grpId="1" nodeType="withEffect">
+                                <p:cTn id="55" presetID="15" presetClass="entr" presetSubtype="0" fill="hold" grpId="1" nodeType="withEffect">
                                   <p:stCondLst>
-                                    <p:cond delay="800"/>
+                                    <p:cond delay="0"/>
                                   </p:stCondLst>
+                                  <p:iterate type="lt">
+                                    <p:tmPct val="6000"/>
+                                  </p:iterate>
                                   <p:childTnLst>
                                     <p:set>
                                       <p:cBhvr>
@@ -5551,17 +5759,55 @@
                                         <p:strVal val="visible"/>
                                       </p:to>
                                     </p:set>
-                                    <p:animEffect transition="in" filter="fade">
+                                    <p:anim calcmode="lin" valueType="num">
                                       <p:cBhvr>
-                                        <p:cTn id="57" dur="500"/>
+                                        <p:cTn id="57" dur="1000" fill="hold"/>
                                         <p:tgtEl>
                                           <p:spTgt spid="4"/>
                                         </p:tgtEl>
+                                        <p:attrNameLst>
+                                          <p:attrName>ppt_w</p:attrName>
+                                        </p:attrNameLst>
                                       </p:cBhvr>
-                                    </p:animEffect>
+                                      <p:tavLst>
+                                        <p:tav tm="0">
+                                          <p:val>
+                                            <p:fltVal val="0"/>
+                                          </p:val>
+                                        </p:tav>
+                                        <p:tav tm="100000">
+                                          <p:val>
+                                            <p:strVal val="#ppt_w"/>
+                                          </p:val>
+                                        </p:tav>
+                                      </p:tavLst>
+                                    </p:anim>
                                     <p:anim calcmode="lin" valueType="num">
                                       <p:cBhvr>
-                                        <p:cTn id="58" dur="500" fill="hold"/>
+                                        <p:cTn id="58" dur="1000" fill="hold"/>
+                                        <p:tgtEl>
+                                          <p:spTgt spid="4"/>
+                                        </p:tgtEl>
+                                        <p:attrNameLst>
+                                          <p:attrName>ppt_h</p:attrName>
+                                        </p:attrNameLst>
+                                      </p:cBhvr>
+                                      <p:tavLst>
+                                        <p:tav tm="0">
+                                          <p:val>
+                                            <p:fltVal val="0"/>
+                                          </p:val>
+                                        </p:tav>
+                                        <p:tav tm="100000">
+                                          <p:val>
+                                            <p:strVal val="#ppt_h"/>
+                                          </p:val>
+                                        </p:tav>
+                                      </p:tavLst>
+                                    </p:anim>
+                                    <p:anim calcmode="lin" valueType="num">
+                                      <p:cBhvr>
+                                        <p:cTn id="59" dur="1000" fill="hold"/>
                                         <p:tgtEl>
                                           <p:spTgt spid="4"/>
                                         </p:tgtEl>
@@ -5570,21 +5816,21 @@
                                         </p:attrNameLst>
                                       </p:cBhvr>
                                       <p:tavLst>
-                                        <p:tav tm="0">
+                                        <p:tav tm="0" fmla="#ppt_x+(cos(-2*pi*(1-$))*-#ppt_x-sin(-2*pi*(1-$))*(1-#ppt_y))*(1-$)">
                                           <p:val>
-                                            <p:strVal val="#ppt_x"/>
+                                            <p:fltVal val="0"/>
                                           </p:val>
                                         </p:tav>
                                         <p:tav tm="100000">
                                           <p:val>
-                                            <p:strVal val="#ppt_x"/>
+                                            <p:fltVal val="1"/>
                                           </p:val>
                                         </p:tav>
                                       </p:tavLst>
                                     </p:anim>
                                     <p:anim calcmode="lin" valueType="num">
                                       <p:cBhvr>
-                                        <p:cTn id="59" dur="500" fill="hold"/>
+                                        <p:cTn id="60" dur="1000" fill="hold"/>
                                         <p:tgtEl>
                                           <p:spTgt spid="4"/>
                                         </p:tgtEl>
@@ -5593,14 +5839,14 @@
                                         </p:attrNameLst>
                                       </p:cBhvr>
                                       <p:tavLst>
-                                        <p:tav tm="0">
+                                        <p:tav tm="0" fmla="#ppt_y+(sin(-2*pi*(1-$))*-#ppt_x+cos(-2*pi*(1-$))*(1-#ppt_y))*(1-$)">
                                           <p:val>
-                                            <p:strVal val="#ppt_y+.1"/>
+                                            <p:fltVal val="0"/>
                                           </p:val>
                                         </p:tav>
                                         <p:tav tm="100000">
                                           <p:val>
-                                            <p:strVal val="#ppt_y"/>
+                                            <p:fltVal val="1"/>
                                           </p:val>
                                         </p:tav>
                                       </p:tavLst>
@@ -5609,14 +5855,86 @@
                                 </p:cTn>
                               </p:par>
                               <p:par>
-                                <p:cTn id="60" presetID="10" presetClass="exit" presetSubtype="0" fill="hold" grpId="0" nodeType="withEffect">
+                                <p:cTn id="61" presetID="31" presetClass="exit" presetSubtype="0" fill="hold" grpId="2" nodeType="withEffect">
                                   <p:stCondLst>
-                                    <p:cond delay="3500"/>
+                                    <p:cond delay="3000"/>
                                   </p:stCondLst>
+                                  <p:iterate type="lt">
+                                    <p:tmPct val="6000"/>
+                                  </p:iterate>
                                   <p:childTnLst>
+                                    <p:anim calcmode="lin" valueType="num">
+                                      <p:cBhvr>
+                                        <p:cTn id="62" dur="1000"/>
+                                        <p:tgtEl>
+                                          <p:spTgt spid="4"/>
+                                        </p:tgtEl>
+                                        <p:attrNameLst>
+                                          <p:attrName>ppt_w</p:attrName>
+                                        </p:attrNameLst>
+                                      </p:cBhvr>
+                                      <p:tavLst>
+                                        <p:tav tm="0">
+                                          <p:val>
+                                            <p:strVal val="ppt_w"/>
+                                          </p:val>
+                                        </p:tav>
+                                        <p:tav tm="100000">
+                                          <p:val>
+                                            <p:fltVal val="0"/>
+                                          </p:val>
+                                        </p:tav>
+                                      </p:tavLst>
+                                    </p:anim>
+                                    <p:anim calcmode="lin" valueType="num">
+                                      <p:cBhvr>
+                                        <p:cTn id="63" dur="1000"/>
+                                        <p:tgtEl>
+                                          <p:spTgt spid="4"/>
+                                        </p:tgtEl>
+                                        <p:attrNameLst>
+                                          <p:attrName>ppt_h</p:attrName>
+                                        </p:attrNameLst>
+                                      </p:cBhvr>
+                                      <p:tavLst>
+                                        <p:tav tm="0">
+                                          <p:val>
+                                            <p:strVal val="ppt_h"/>
+                                          </p:val>
+                                        </p:tav>
+                                        <p:tav tm="100000">
+                                          <p:val>
+                                            <p:fltVal val="0"/>
+                                          </p:val>
+                                        </p:tav>
+                                      </p:tavLst>
+                                    </p:anim>
+                                    <p:anim calcmode="lin" valueType="num">
+                                      <p:cBhvr>
+                                        <p:cTn id="64" dur="1000"/>
+                                        <p:tgtEl>
+                                          <p:spTgt spid="4"/>
+                                        </p:tgtEl>
+                                        <p:attrNameLst>
+                                          <p:attrName>style.rotation</p:attrName>
+                                        </p:attrNameLst>
+                                      </p:cBhvr>
+                                      <p:tavLst>
+                                        <p:tav tm="0">
+                                          <p:val>
+                                            <p:fltVal val="0"/>
+                                          </p:val>
+                                        </p:tav>
+                                        <p:tav tm="100000">
+                                          <p:val>
+                                            <p:fltVal val="90"/>
+                                          </p:val>
+                                        </p:tav>
+                                      </p:tavLst>
+                                    </p:anim>
                                     <p:animEffect transition="out" filter="fade">
                                       <p:cBhvr>
-                                        <p:cTn id="61" dur="500"/>
+                                        <p:cTn id="65" dur="1000"/>
                                         <p:tgtEl>
                                           <p:spTgt spid="4"/>
                                         </p:tgtEl>
@@ -5624,9 +5942,9 @@
                                     </p:animEffect>
                                     <p:set>
                                       <p:cBhvr>
-                                        <p:cTn id="62" dur="1" fill="hold">
+                                        <p:cTn id="66" dur="1" fill="hold">
                                           <p:stCondLst>
-                                            <p:cond delay="499"/>
+                                            <p:cond delay="999"/>
                                           </p:stCondLst>
                                         </p:cTn>
                                         <p:tgtEl>
@@ -5644,14 +5962,17 @@
                                 </p:cTn>
                               </p:par>
                               <p:par>
-                                <p:cTn id="63" presetID="42" presetClass="entr" presetSubtype="0" fill="hold" grpId="0" nodeType="withEffect">
+                                <p:cTn id="67" presetID="42" presetClass="entr" presetSubtype="0" fill="hold" grpId="0" nodeType="withEffect">
                                   <p:stCondLst>
-                                    <p:cond delay="3600"/>
+                                    <p:cond delay="3200"/>
                                   </p:stCondLst>
+                                  <p:iterate type="lt">
+                                    <p:tmPct val="2000"/>
+                                  </p:iterate>
                                   <p:childTnLst>
                                     <p:set>
                                       <p:cBhvr>
-                                        <p:cTn id="64" dur="1" fill="hold">
+                                        <p:cTn id="68" dur="1" fill="hold">
                                           <p:stCondLst>
                                             <p:cond delay="0"/>
                                           </p:stCondLst>
@@ -5669,7 +5990,7 @@
                                     </p:set>
                                     <p:animEffect transition="in" filter="fade">
                                       <p:cBhvr>
-                                        <p:cTn id="65" dur="1000"/>
+                                        <p:cTn id="69" dur="1000"/>
                                         <p:tgtEl>
                                           <p:spTgt spid="7"/>
                                         </p:tgtEl>
@@ -5677,7 +5998,7 @@
                                     </p:animEffect>
                                     <p:anim calcmode="lin" valueType="num">
                                       <p:cBhvr>
-                                        <p:cTn id="66" dur="1000" fill="hold"/>
+                                        <p:cTn id="70" dur="1000" fill="hold"/>
                                         <p:tgtEl>
                                           <p:spTgt spid="7"/>
                                         </p:tgtEl>
@@ -5700,7 +6021,7 @@
                                     </p:anim>
                                     <p:anim calcmode="lin" valueType="num">
                                       <p:cBhvr>
-                                        <p:cTn id="67" dur="1000" fill="hold"/>
+                                        <p:cTn id="71" dur="1000" fill="hold"/>
                                         <p:tgtEl>
                                           <p:spTgt spid="7"/>
                                         </p:tgtEl>
@@ -5725,14 +6046,17 @@
                                 </p:cTn>
                               </p:par>
                               <p:par>
-                                <p:cTn id="68" presetID="10" presetClass="exit" presetSubtype="0" fill="hold" grpId="1" nodeType="withEffect">
+                                <p:cTn id="72" presetID="10" presetClass="exit" presetSubtype="0" fill="hold" grpId="1" nodeType="withEffect">
                                   <p:stCondLst>
-                                    <p:cond delay="8900"/>
+                                    <p:cond delay="7500"/>
                                   </p:stCondLst>
+                                  <p:iterate type="lt">
+                                    <p:tmPct val="0"/>
+                                  </p:iterate>
                                   <p:childTnLst>
                                     <p:animEffect transition="out" filter="fade">
                                       <p:cBhvr>
-                                        <p:cTn id="69" dur="600"/>
+                                        <p:cTn id="73" dur="600"/>
                                         <p:tgtEl>
                                           <p:spTgt spid="7"/>
                                         </p:tgtEl>
@@ -5740,7 +6064,7 @@
                                     </p:animEffect>
                                     <p:set>
                                       <p:cBhvr>
-                                        <p:cTn id="70" dur="1" fill="hold">
+                                        <p:cTn id="74" dur="1" fill="hold">
                                           <p:stCondLst>
                                             <p:cond delay="599"/>
                                           </p:stCondLst>
@@ -5760,14 +6084,17 @@
                                 </p:cTn>
                               </p:par>
                               <p:par>
-                                <p:cTn id="71" presetID="42" presetClass="entr" presetSubtype="0" fill="hold" grpId="0" nodeType="withEffect">
+                                <p:cTn id="75" presetID="15" presetClass="entr" presetSubtype="0" fill="hold" grpId="2" nodeType="withEffect">
                                   <p:stCondLst>
-                                    <p:cond delay="9000"/>
+                                    <p:cond delay="7500"/>
                                   </p:stCondLst>
+                                  <p:iterate type="lt">
+                                    <p:tmPct val="2000"/>
+                                  </p:iterate>
                                   <p:childTnLst>
                                     <p:set>
                                       <p:cBhvr>
-                                        <p:cTn id="72" dur="1" fill="hold">
+                                        <p:cTn id="76" dur="1" fill="hold">
                                           <p:stCondLst>
                                             <p:cond delay="0"/>
                                           </p:stCondLst>
@@ -5783,17 +6110,55 @@
                                         <p:strVal val="visible"/>
                                       </p:to>
                                     </p:set>
-                                    <p:animEffect transition="in" filter="fade">
+                                    <p:anim calcmode="lin" valueType="num">
                                       <p:cBhvr>
-                                        <p:cTn id="73" dur="1100"/>
+                                        <p:cTn id="77" dur="1400" fill="hold"/>
                                         <p:tgtEl>
                                           <p:spTgt spid="6"/>
                                         </p:tgtEl>
+                                        <p:attrNameLst>
+                                          <p:attrName>ppt_w</p:attrName>
+                                        </p:attrNameLst>
                                       </p:cBhvr>
-                                    </p:animEffect>
+                                      <p:tavLst>
+                                        <p:tav tm="0">
+                                          <p:val>
+                                            <p:fltVal val="0"/>
+                                          </p:val>
+                                        </p:tav>
+                                        <p:tav tm="100000">
+                                          <p:val>
+                                            <p:strVal val="#ppt_w"/>
+                                          </p:val>
+                                        </p:tav>
+                                      </p:tavLst>
+                                    </p:anim>
                                     <p:anim calcmode="lin" valueType="num">
                                       <p:cBhvr>
-                                        <p:cTn id="74" dur="1100" fill="hold"/>
+                                        <p:cTn id="78" dur="1400" fill="hold"/>
+                                        <p:tgtEl>
+                                          <p:spTgt spid="6"/>
+                                        </p:tgtEl>
+                                        <p:attrNameLst>
+                                          <p:attrName>ppt_h</p:attrName>
+                                        </p:attrNameLst>
+                                      </p:cBhvr>
+                                      <p:tavLst>
+                                        <p:tav tm="0">
+                                          <p:val>
+                                            <p:fltVal val="0"/>
+                                          </p:val>
+                                        </p:tav>
+                                        <p:tav tm="100000">
+                                          <p:val>
+                                            <p:strVal val="#ppt_h"/>
+                                          </p:val>
+                                        </p:tav>
+                                      </p:tavLst>
+                                    </p:anim>
+                                    <p:anim calcmode="lin" valueType="num">
+                                      <p:cBhvr>
+                                        <p:cTn id="79" dur="1400" fill="hold"/>
                                         <p:tgtEl>
                                           <p:spTgt spid="6"/>
                                         </p:tgtEl>
@@ -5802,21 +6167,21 @@
                                         </p:attrNameLst>
                                       </p:cBhvr>
                                       <p:tavLst>
-                                        <p:tav tm="0">
+                                        <p:tav tm="0" fmla="#ppt_x+(cos(-2*pi*(1-$))*-#ppt_x-sin(-2*pi*(1-$))*(1-#ppt_y))*(1-$)">
                                           <p:val>
-                                            <p:strVal val="#ppt_x"/>
+                                            <p:fltVal val="0"/>
                                           </p:val>
                                         </p:tav>
                                         <p:tav tm="100000">
                                           <p:val>
-                                            <p:strVal val="#ppt_x"/>
+                                            <p:fltVal val="1"/>
                                           </p:val>
                                         </p:tav>
                                       </p:tavLst>
                                     </p:anim>
                                     <p:anim calcmode="lin" valueType="num">
                                       <p:cBhvr>
-                                        <p:cTn id="75" dur="1100" fill="hold"/>
+                                        <p:cTn id="80" dur="1400" fill="hold"/>
                                         <p:tgtEl>
                                           <p:spTgt spid="6"/>
                                         </p:tgtEl>
@@ -5825,14 +6190,14 @@
                                         </p:attrNameLst>
                                       </p:cBhvr>
                                       <p:tavLst>
-                                        <p:tav tm="0">
+                                        <p:tav tm="0" fmla="#ppt_y+(sin(-2*pi*(1-$))*-#ppt_x+cos(-2*pi*(1-$))*(1-#ppt_y))*(1-$)">
                                           <p:val>
-                                            <p:strVal val="#ppt_y+.1"/>
+                                            <p:fltVal val="0"/>
                                           </p:val>
                                         </p:tav>
                                         <p:tav tm="100000">
                                           <p:val>
-                                            <p:strVal val="#ppt_y"/>
+                                            <p:fltVal val="1"/>
                                           </p:val>
                                         </p:tav>
                                       </p:tavLst>
@@ -5841,14 +6206,17 @@
                                 </p:cTn>
                               </p:par>
                               <p:par>
-                                <p:cTn id="76" presetID="10" presetClass="exit" presetSubtype="0" fill="hold" grpId="1" nodeType="withEffect">
+                                <p:cTn id="81" presetID="10" presetClass="exit" presetSubtype="0" fill="hold" grpId="1" nodeType="withEffect">
                                   <p:stCondLst>
-                                    <p:cond delay="12000"/>
+                                    <p:cond delay="12400"/>
                                   </p:stCondLst>
+                                  <p:iterate type="lt">
+                                    <p:tmPct val="0"/>
+                                  </p:iterate>
                                   <p:childTnLst>
                                     <p:animEffect transition="out" filter="fade">
                                       <p:cBhvr>
-                                        <p:cTn id="77" dur="600"/>
+                                        <p:cTn id="82" dur="600"/>
                                         <p:tgtEl>
                                           <p:spTgt spid="6"/>
                                         </p:tgtEl>
@@ -5856,7 +6224,7 @@
                                     </p:animEffect>
                                     <p:set>
                                       <p:cBhvr>
-                                        <p:cTn id="78" dur="1" fill="hold">
+                                        <p:cTn id="83" dur="1" fill="hold">
                                           <p:stCondLst>
                                             <p:cond delay="599"/>
                                           </p:stCondLst>
@@ -5876,14 +6244,14 @@
                                 </p:cTn>
                               </p:par>
                               <p:par>
-                                <p:cTn id="79" presetID="42" presetClass="entr" presetSubtype="0" fill="hold" grpId="0" nodeType="withEffect">
+                                <p:cTn id="84" presetID="42" presetClass="entr" presetSubtype="0" fill="hold" grpId="0" nodeType="withEffect">
                                   <p:stCondLst>
-                                    <p:cond delay="12100"/>
+                                    <p:cond delay="12400"/>
                                   </p:stCondLst>
                                   <p:childTnLst>
                                     <p:set>
                                       <p:cBhvr>
-                                        <p:cTn id="80" dur="1" fill="hold">
+                                        <p:cTn id="85" dur="1" fill="hold">
                                           <p:stCondLst>
                                             <p:cond delay="0"/>
                                           </p:stCondLst>
@@ -5901,7 +6269,7 @@
                                     </p:set>
                                     <p:animEffect transition="in" filter="fade">
                                       <p:cBhvr>
-                                        <p:cTn id="81" dur="1500"/>
+                                        <p:cTn id="86" dur="1500"/>
                                         <p:tgtEl>
                                           <p:spTgt spid="5"/>
                                         </p:tgtEl>
@@ -5909,7 +6277,7 @@
                                     </p:animEffect>
                                     <p:anim calcmode="lin" valueType="num">
                                       <p:cBhvr>
-                                        <p:cTn id="82" dur="1500" fill="hold"/>
+                                        <p:cTn id="87" dur="1500" fill="hold"/>
                                         <p:tgtEl>
                                           <p:spTgt spid="5"/>
                                         </p:tgtEl>
@@ -5932,7 +6300,7 @@
                                     </p:anim>
                                     <p:anim calcmode="lin" valueType="num">
                                       <p:cBhvr>
-                                        <p:cTn id="83" dur="1500" fill="hold"/>
+                                        <p:cTn id="88" dur="1500" fill="hold"/>
                                         <p:tgtEl>
                                           <p:spTgt spid="5"/>
                                         </p:tgtEl>
@@ -5984,13 +6352,13 @@
       </p:par>
     </p:tnLst>
     <p:bldLst>
-      <p:bldP spid="4" grpId="0"/>
       <p:bldP spid="4" grpId="1"/>
+      <p:bldP spid="4" grpId="2"/>
       <p:bldP spid="5" grpId="0"/>
       <p:bldP spid="7" grpId="0"/>
       <p:bldP spid="7" grpId="1"/>
-      <p:bldP spid="6" grpId="0"/>
       <p:bldP spid="6" grpId="1"/>
+      <p:bldP spid="6" grpId="2"/>
     </p:bldLst>
   </p:timing>
 </p:sld>

</xml_diff>